<commit_message>
update basic des module
</commit_message>
<xml_diff>
--- a/memo_presentation/memo.pptx
+++ b/memo_presentation/memo.pptx
@@ -6617,7 +6617,7 @@
           <a:p>
             <a:fld id="{0DC68087-21ED-4D11-84F5-9CB72CA4410E}" type="datetimeFigureOut">
               <a:rPr lang="th-TH" smtClean="0"/>
-              <a:t>21/08/66</a:t>
+              <a:t>22/08/66</a:t>
             </a:fld>
             <a:endParaRPr lang="th-TH"/>
           </a:p>
@@ -6817,7 +6817,7 @@
           <a:p>
             <a:fld id="{0DC68087-21ED-4D11-84F5-9CB72CA4410E}" type="datetimeFigureOut">
               <a:rPr lang="th-TH" smtClean="0"/>
-              <a:t>21/08/66</a:t>
+              <a:t>22/08/66</a:t>
             </a:fld>
             <a:endParaRPr lang="th-TH"/>
           </a:p>
@@ -7027,7 +7027,7 @@
           <a:p>
             <a:fld id="{0DC68087-21ED-4D11-84F5-9CB72CA4410E}" type="datetimeFigureOut">
               <a:rPr lang="th-TH" smtClean="0"/>
-              <a:t>21/08/66</a:t>
+              <a:t>22/08/66</a:t>
             </a:fld>
             <a:endParaRPr lang="th-TH"/>
           </a:p>
@@ -7227,7 +7227,7 @@
           <a:p>
             <a:fld id="{0DC68087-21ED-4D11-84F5-9CB72CA4410E}" type="datetimeFigureOut">
               <a:rPr lang="th-TH" smtClean="0"/>
-              <a:t>21/08/66</a:t>
+              <a:t>22/08/66</a:t>
             </a:fld>
             <a:endParaRPr lang="th-TH"/>
           </a:p>
@@ -7503,7 +7503,7 @@
           <a:p>
             <a:fld id="{0DC68087-21ED-4D11-84F5-9CB72CA4410E}" type="datetimeFigureOut">
               <a:rPr lang="th-TH" smtClean="0"/>
-              <a:t>21/08/66</a:t>
+              <a:t>22/08/66</a:t>
             </a:fld>
             <a:endParaRPr lang="th-TH"/>
           </a:p>
@@ -7771,7 +7771,7 @@
           <a:p>
             <a:fld id="{0DC68087-21ED-4D11-84F5-9CB72CA4410E}" type="datetimeFigureOut">
               <a:rPr lang="th-TH" smtClean="0"/>
-              <a:t>21/08/66</a:t>
+              <a:t>22/08/66</a:t>
             </a:fld>
             <a:endParaRPr lang="th-TH"/>
           </a:p>
@@ -8186,7 +8186,7 @@
           <a:p>
             <a:fld id="{0DC68087-21ED-4D11-84F5-9CB72CA4410E}" type="datetimeFigureOut">
               <a:rPr lang="th-TH" smtClean="0"/>
-              <a:t>21/08/66</a:t>
+              <a:t>22/08/66</a:t>
             </a:fld>
             <a:endParaRPr lang="th-TH"/>
           </a:p>
@@ -8328,7 +8328,7 @@
           <a:p>
             <a:fld id="{0DC68087-21ED-4D11-84F5-9CB72CA4410E}" type="datetimeFigureOut">
               <a:rPr lang="th-TH" smtClean="0"/>
-              <a:t>21/08/66</a:t>
+              <a:t>22/08/66</a:t>
             </a:fld>
             <a:endParaRPr lang="th-TH"/>
           </a:p>
@@ -8441,7 +8441,7 @@
           <a:p>
             <a:fld id="{0DC68087-21ED-4D11-84F5-9CB72CA4410E}" type="datetimeFigureOut">
               <a:rPr lang="th-TH" smtClean="0"/>
-              <a:t>21/08/66</a:t>
+              <a:t>22/08/66</a:t>
             </a:fld>
             <a:endParaRPr lang="th-TH"/>
           </a:p>
@@ -8754,7 +8754,7 @@
           <a:p>
             <a:fld id="{0DC68087-21ED-4D11-84F5-9CB72CA4410E}" type="datetimeFigureOut">
               <a:rPr lang="th-TH" smtClean="0"/>
-              <a:t>21/08/66</a:t>
+              <a:t>22/08/66</a:t>
             </a:fld>
             <a:endParaRPr lang="th-TH"/>
           </a:p>
@@ -9043,7 +9043,7 @@
           <a:p>
             <a:fld id="{0DC68087-21ED-4D11-84F5-9CB72CA4410E}" type="datetimeFigureOut">
               <a:rPr lang="th-TH" smtClean="0"/>
-              <a:t>21/08/66</a:t>
+              <a:t>22/08/66</a:t>
             </a:fld>
             <a:endParaRPr lang="th-TH"/>
           </a:p>
@@ -9286,7 +9286,7 @@
           <a:p>
             <a:fld id="{0DC68087-21ED-4D11-84F5-9CB72CA4410E}" type="datetimeFigureOut">
               <a:rPr lang="th-TH" smtClean="0"/>
-              <a:t>21/08/66</a:t>
+              <a:t>22/08/66</a:t>
             </a:fld>
             <a:endParaRPr lang="th-TH"/>
           </a:p>
@@ -10909,7 +10909,7 @@
             <p:ph idx="1"/>
             <p:extLst>
               <p:ext uri="{D42A27DB-BD31-4B8C-83A1-F6EECF244321}">
-                <p14:modId xmlns:p14="http://schemas.microsoft.com/office/powerpoint/2010/main" val="4080003139"/>
+                <p14:modId xmlns:p14="http://schemas.microsoft.com/office/powerpoint/2010/main" val="245429331"/>
               </p:ext>
             </p:extLst>
           </p:nvPr>

</xml_diff>